<commit_message>
Added tank / pump respone measurement
</commit_message>
<xml_diff>
--- a/_3 Develop/Design Pictures.pptx
+++ b/_3 Develop/Design Pictures.pptx
@@ -5,11 +5,12 @@
     <p:sldMasterId id="2147483648" r:id="rId1"/>
   </p:sldMasterIdLst>
   <p:notesMasterIdLst>
-    <p:notesMasterId r:id="rId4"/>
+    <p:notesMasterId r:id="rId5"/>
   </p:notesMasterIdLst>
   <p:sldIdLst>
-    <p:sldId id="257" r:id="rId2"/>
-    <p:sldId id="256" r:id="rId3"/>
+    <p:sldId id="258" r:id="rId2"/>
+    <p:sldId id="257" r:id="rId3"/>
+    <p:sldId id="256" r:id="rId4"/>
   </p:sldIdLst>
   <p:sldSz cx="12192000" cy="6858000"/>
   <p:notesSz cx="7315200" cy="9601200"/>
@@ -209,7 +210,7 @@
           <a:p>
             <a:fld id="{90B77117-200D-4C24-9444-A3272AC92708}" type="datetimeFigureOut">
               <a:rPr lang="en-US" smtClean="0"/>
-              <a:t>3/3/2025</a:t>
+              <a:t>3/4/2025</a:t>
             </a:fld>
             <a:endParaRPr lang="en-US"/>
           </a:p>
@@ -623,7 +624,7 @@
           <a:p>
             <a:fld id="{C0029B18-9E45-4374-8673-2D4794710B00}" type="datetimeFigureOut">
               <a:rPr lang="en-US" smtClean="0"/>
-              <a:t>3/3/2025</a:t>
+              <a:t>3/4/2025</a:t>
             </a:fld>
             <a:endParaRPr lang="en-US"/>
           </a:p>
@@ -821,7 +822,7 @@
           <a:p>
             <a:fld id="{C0029B18-9E45-4374-8673-2D4794710B00}" type="datetimeFigureOut">
               <a:rPr lang="en-US" smtClean="0"/>
-              <a:t>3/3/2025</a:t>
+              <a:t>3/4/2025</a:t>
             </a:fld>
             <a:endParaRPr lang="en-US"/>
           </a:p>
@@ -1029,7 +1030,7 @@
           <a:p>
             <a:fld id="{C0029B18-9E45-4374-8673-2D4794710B00}" type="datetimeFigureOut">
               <a:rPr lang="en-US" smtClean="0"/>
-              <a:t>3/3/2025</a:t>
+              <a:t>3/4/2025</a:t>
             </a:fld>
             <a:endParaRPr lang="en-US"/>
           </a:p>
@@ -1227,7 +1228,7 @@
           <a:p>
             <a:fld id="{C0029B18-9E45-4374-8673-2D4794710B00}" type="datetimeFigureOut">
               <a:rPr lang="en-US" smtClean="0"/>
-              <a:t>3/3/2025</a:t>
+              <a:t>3/4/2025</a:t>
             </a:fld>
             <a:endParaRPr lang="en-US"/>
           </a:p>
@@ -1502,7 +1503,7 @@
           <a:p>
             <a:fld id="{C0029B18-9E45-4374-8673-2D4794710B00}" type="datetimeFigureOut">
               <a:rPr lang="en-US" smtClean="0"/>
-              <a:t>3/3/2025</a:t>
+              <a:t>3/4/2025</a:t>
             </a:fld>
             <a:endParaRPr lang="en-US"/>
           </a:p>
@@ -1767,7 +1768,7 @@
           <a:p>
             <a:fld id="{C0029B18-9E45-4374-8673-2D4794710B00}" type="datetimeFigureOut">
               <a:rPr lang="en-US" smtClean="0"/>
-              <a:t>3/3/2025</a:t>
+              <a:t>3/4/2025</a:t>
             </a:fld>
             <a:endParaRPr lang="en-US"/>
           </a:p>
@@ -2179,7 +2180,7 @@
           <a:p>
             <a:fld id="{C0029B18-9E45-4374-8673-2D4794710B00}" type="datetimeFigureOut">
               <a:rPr lang="en-US" smtClean="0"/>
-              <a:t>3/3/2025</a:t>
+              <a:t>3/4/2025</a:t>
             </a:fld>
             <a:endParaRPr lang="en-US"/>
           </a:p>
@@ -2320,7 +2321,7 @@
           <a:p>
             <a:fld id="{C0029B18-9E45-4374-8673-2D4794710B00}" type="datetimeFigureOut">
               <a:rPr lang="en-US" smtClean="0"/>
-              <a:t>3/3/2025</a:t>
+              <a:t>3/4/2025</a:t>
             </a:fld>
             <a:endParaRPr lang="en-US"/>
           </a:p>
@@ -2433,7 +2434,7 @@
           <a:p>
             <a:fld id="{C0029B18-9E45-4374-8673-2D4794710B00}" type="datetimeFigureOut">
               <a:rPr lang="en-US" smtClean="0"/>
-              <a:t>3/3/2025</a:t>
+              <a:t>3/4/2025</a:t>
             </a:fld>
             <a:endParaRPr lang="en-US"/>
           </a:p>
@@ -2744,7 +2745,7 @@
           <a:p>
             <a:fld id="{C0029B18-9E45-4374-8673-2D4794710B00}" type="datetimeFigureOut">
               <a:rPr lang="en-US" smtClean="0"/>
-              <a:t>3/3/2025</a:t>
+              <a:t>3/4/2025</a:t>
             </a:fld>
             <a:endParaRPr lang="en-US"/>
           </a:p>
@@ -3032,7 +3033,7 @@
           <a:p>
             <a:fld id="{C0029B18-9E45-4374-8673-2D4794710B00}" type="datetimeFigureOut">
               <a:rPr lang="en-US" smtClean="0"/>
-              <a:t>3/3/2025</a:t>
+              <a:t>3/4/2025</a:t>
             </a:fld>
             <a:endParaRPr lang="en-US"/>
           </a:p>
@@ -3273,7 +3274,7 @@
           <a:p>
             <a:fld id="{C0029B18-9E45-4374-8673-2D4794710B00}" type="datetimeFigureOut">
               <a:rPr lang="en-US" smtClean="0"/>
-              <a:t>3/3/2025</a:t>
+              <a:t>3/4/2025</a:t>
             </a:fld>
             <a:endParaRPr lang="en-US"/>
           </a:p>
@@ -3695,6 +3696,241 @@
           <p:cNvPr id="2" name="Title 1">
             <a:extLst>
               <a:ext uri="{FF2B5EF4-FFF2-40B4-BE49-F238E27FC236}">
+                <a16:creationId xmlns:a16="http://schemas.microsoft.com/office/drawing/2014/main" id="{87288C4F-7029-D810-3078-BCF31F22188D}"/>
+              </a:ext>
+            </a:extLst>
+          </p:cNvPr>
+          <p:cNvSpPr>
+            <a:spLocks noGrp="1"/>
+          </p:cNvSpPr>
+          <p:nvPr>
+            <p:ph type="title"/>
+          </p:nvPr>
+        </p:nvSpPr>
+        <p:spPr/>
+        <p:txBody>
+          <a:bodyPr/>
+          <a:lstStyle/>
+          <a:p>
+            <a:r>
+              <a:rPr lang="en-US" dirty="0"/>
+              <a:t>Tank Level Response</a:t>
+            </a:r>
+          </a:p>
+        </p:txBody>
+      </p:sp>
+      <p:sp>
+        <p:nvSpPr>
+          <p:cNvPr id="3" name="Content Placeholder 2">
+            <a:extLst>
+              <a:ext uri="{FF2B5EF4-FFF2-40B4-BE49-F238E27FC236}">
+                <a16:creationId xmlns:a16="http://schemas.microsoft.com/office/drawing/2014/main" id="{46ED75FA-F5DA-C361-1A71-D2172F4FEE3F}"/>
+              </a:ext>
+            </a:extLst>
+          </p:cNvPr>
+          <p:cNvSpPr>
+            <a:spLocks noGrp="1"/>
+          </p:cNvSpPr>
+          <p:nvPr>
+            <p:ph idx="1"/>
+          </p:nvPr>
+        </p:nvSpPr>
+        <p:spPr>
+          <a:xfrm>
+            <a:off x="838200" y="1561575"/>
+            <a:ext cx="6113745" cy="4351338"/>
+          </a:xfrm>
+        </p:spPr>
+        <p:txBody>
+          <a:bodyPr>
+            <a:normAutofit/>
+          </a:bodyPr>
+          <a:lstStyle/>
+          <a:p>
+            <a:pPr marL="0" indent="0">
+              <a:buNone/>
+            </a:pPr>
+            <a:r>
+              <a:rPr lang="en-US" sz="2000" dirty="0"/>
+              <a:t>Using the </a:t>
+            </a:r>
+            <a:r>
+              <a:rPr lang="en-US" sz="2000" dirty="0" err="1"/>
+              <a:t>Pololu</a:t>
+            </a:r>
+            <a:r>
+              <a:rPr lang="en-US" sz="2000" dirty="0"/>
+              <a:t> MC18V7 PWM motor controller with Vs set to 24Vdc,  The </a:t>
+            </a:r>
+            <a:r>
+              <a:rPr lang="en-US" sz="2000" dirty="0">
+                <a:sym typeface="Symbol" panose="05050102010706020507" pitchFamily="18" charset="2"/>
+              </a:rPr>
+              <a:t> Level was measure for 30 seconds at various percent of max speed (100% duty cycle) for both FILL and DRAIN at near EMPTY and near FULL.</a:t>
+            </a:r>
+          </a:p>
+          <a:p>
+            <a:pPr marL="0" indent="0">
+              <a:buNone/>
+            </a:pPr>
+            <a:r>
+              <a:rPr lang="en-US" sz="2000" dirty="0">
+                <a:sym typeface="Symbol" panose="05050102010706020507" pitchFamily="18" charset="2"/>
+              </a:rPr>
+              <a:t>The response has a minor shift at each case but is basically linear down to about 5% resulting in fill rate of about 0.1”/min where the control becomes unstable by 4% as shown in the ‘Zoomed In Plot.</a:t>
+            </a:r>
+          </a:p>
+          <a:p>
+            <a:pPr marL="0" indent="0">
+              <a:buNone/>
+            </a:pPr>
+            <a:r>
+              <a:rPr lang="en-US" sz="2000" b="1" u="sng" dirty="0">
+                <a:sym typeface="Symbol" panose="05050102010706020507" pitchFamily="18" charset="2"/>
+              </a:rPr>
+              <a:t>Without doing an extensive fluid analysis, this response is assumed to be adequate for the MLOI application. </a:t>
+            </a:r>
+          </a:p>
+          <a:p>
+            <a:pPr marL="0" indent="0">
+              <a:buNone/>
+            </a:pPr>
+            <a:r>
+              <a:rPr lang="en-US" sz="1600" dirty="0">
+                <a:sym typeface="Symbol" panose="05050102010706020507" pitchFamily="18" charset="2"/>
+              </a:rPr>
+              <a:t>Data from </a:t>
+            </a:r>
+            <a:r>
+              <a:rPr lang="en-US" sz="1600" dirty="0" err="1">
+                <a:sym typeface="Symbol" panose="05050102010706020507" pitchFamily="18" charset="2"/>
+              </a:rPr>
+              <a:t>mloi</a:t>
+            </a:r>
+            <a:r>
+              <a:rPr lang="en-US" sz="1600" dirty="0">
+                <a:sym typeface="Symbol" panose="05050102010706020507" pitchFamily="18" charset="2"/>
+              </a:rPr>
+              <a:t>:\</a:t>
+            </a:r>
+            <a:r>
+              <a:rPr lang="en-US" sz="1600" dirty="0" err="1">
+                <a:sym typeface="Symbol" panose="05050102010706020507" pitchFamily="18" charset="2"/>
+              </a:rPr>
+              <a:t>PM_Folder</a:t>
+            </a:r>
+            <a:r>
+              <a:rPr lang="en-US" sz="1600" dirty="0">
+                <a:sym typeface="Symbol" panose="05050102010706020507" pitchFamily="18" charset="2"/>
+              </a:rPr>
+              <a:t>\_3 Develop\Design Calculations.xlsx sheet Tank.  3/4/2025 R. Ales</a:t>
+            </a:r>
+          </a:p>
+          <a:p>
+            <a:pPr marL="0" indent="0">
+              <a:buNone/>
+            </a:pPr>
+            <a:endParaRPr lang="en-US" sz="2000" dirty="0">
+              <a:sym typeface="Symbol" panose="05050102010706020507" pitchFamily="18" charset="2"/>
+            </a:endParaRPr>
+          </a:p>
+        </p:txBody>
+      </p:sp>
+      <p:pic>
+        <p:nvPicPr>
+          <p:cNvPr id="8" name="Picture 7">
+            <a:extLst>
+              <a:ext uri="{FF2B5EF4-FFF2-40B4-BE49-F238E27FC236}">
+                <a16:creationId xmlns:a16="http://schemas.microsoft.com/office/drawing/2014/main" id="{94D5C051-3120-E3B0-331F-9950727FDF39}"/>
+              </a:ext>
+            </a:extLst>
+          </p:cNvPr>
+          <p:cNvPicPr>
+            <a:picLocks noChangeAspect="1"/>
+          </p:cNvPicPr>
+          <p:nvPr/>
+        </p:nvPicPr>
+        <p:blipFill>
+          <a:blip r:embed="rId2"/>
+          <a:stretch>
+            <a:fillRect/>
+          </a:stretch>
+        </p:blipFill>
+        <p:spPr>
+          <a:xfrm>
+            <a:off x="7137716" y="914144"/>
+            <a:ext cx="4584589" cy="2755631"/>
+          </a:xfrm>
+          <a:prstGeom prst="rect">
+            <a:avLst/>
+          </a:prstGeom>
+        </p:spPr>
+      </p:pic>
+      <p:pic>
+        <p:nvPicPr>
+          <p:cNvPr id="10" name="Picture 9">
+            <a:extLst>
+              <a:ext uri="{FF2B5EF4-FFF2-40B4-BE49-F238E27FC236}">
+                <a16:creationId xmlns:a16="http://schemas.microsoft.com/office/drawing/2014/main" id="{CF56FB39-74ED-21F0-A6FA-0485B7313758}"/>
+              </a:ext>
+            </a:extLst>
+          </p:cNvPr>
+          <p:cNvPicPr>
+            <a:picLocks noChangeAspect="1"/>
+          </p:cNvPicPr>
+          <p:nvPr/>
+        </p:nvPicPr>
+        <p:blipFill>
+          <a:blip r:embed="rId3"/>
+          <a:stretch>
+            <a:fillRect/>
+          </a:stretch>
+        </p:blipFill>
+        <p:spPr>
+          <a:xfrm>
+            <a:off x="7137716" y="3737244"/>
+            <a:ext cx="4584589" cy="2755631"/>
+          </a:xfrm>
+          <a:prstGeom prst="rect">
+            <a:avLst/>
+          </a:prstGeom>
+        </p:spPr>
+      </p:pic>
+    </p:spTree>
+    <p:extLst>
+      <p:ext uri="{BB962C8B-B14F-4D97-AF65-F5344CB8AC3E}">
+        <p14:creationId xmlns:p14="http://schemas.microsoft.com/office/powerpoint/2010/main" val="4116884552"/>
+      </p:ext>
+    </p:extLst>
+  </p:cSld>
+  <p:clrMapOvr>
+    <a:masterClrMapping/>
+  </p:clrMapOvr>
+</p:sld>
+</file>
+
+<file path=ppt/slides/slide2.xml><?xml version="1.0" encoding="utf-8"?>
+<p:sld xmlns:a="http://schemas.openxmlformats.org/drawingml/2006/main" xmlns:r="http://schemas.openxmlformats.org/officeDocument/2006/relationships" xmlns:p="http://schemas.openxmlformats.org/presentationml/2006/main">
+  <p:cSld>
+    <p:spTree>
+      <p:nvGrpSpPr>
+        <p:cNvPr id="1" name=""/>
+        <p:cNvGrpSpPr/>
+        <p:nvPr/>
+      </p:nvGrpSpPr>
+      <p:grpSpPr>
+        <a:xfrm>
+          <a:off x="0" y="0"/>
+          <a:ext cx="0" cy="0"/>
+          <a:chOff x="0" y="0"/>
+          <a:chExt cx="0" cy="0"/>
+        </a:xfrm>
+      </p:grpSpPr>
+      <p:sp>
+        <p:nvSpPr>
+          <p:cNvPr id="2" name="Title 1">
+            <a:extLst>
+              <a:ext uri="{FF2B5EF4-FFF2-40B4-BE49-F238E27FC236}">
                 <a16:creationId xmlns:a16="http://schemas.microsoft.com/office/drawing/2014/main" id="{383E45E0-5717-C054-4A8F-75ABE584D226}"/>
               </a:ext>
             </a:extLst>
@@ -3775,7 +4011,7 @@
 </p:sld>
 </file>
 
-<file path=ppt/slides/slide2.xml><?xml version="1.0" encoding="utf-8"?>
+<file path=ppt/slides/slide3.xml><?xml version="1.0" encoding="utf-8"?>
 <p:sld xmlns:a="http://schemas.openxmlformats.org/drawingml/2006/main" xmlns:r="http://schemas.openxmlformats.org/officeDocument/2006/relationships" xmlns:p="http://schemas.openxmlformats.org/presentationml/2006/main">
   <p:cSld>
     <p:spTree>

</xml_diff>